<commit_message>
Update S04P22D102-15 : 화면정의서 수정
</commit_message>
<xml_diff>
--- a/산출물/화면정의서.pptx
+++ b/산출물/화면정의서.pptx
@@ -5,7 +5,7 @@
     <p:sldMasterId id="2147483648" r:id="rId1"/>
   </p:sldMasterIdLst>
   <p:notesMasterIdLst>
-    <p:notesMasterId r:id="rId9"/>
+    <p:notesMasterId r:id="rId8"/>
   </p:notesMasterIdLst>
   <p:sldIdLst>
     <p:sldId id="256" r:id="rId2"/>
@@ -14,23 +14,22 @@
     <p:sldId id="259" r:id="rId5"/>
     <p:sldId id="260" r:id="rId6"/>
     <p:sldId id="261" r:id="rId7"/>
-    <p:sldId id="262" r:id="rId8"/>
   </p:sldIdLst>
   <p:sldSz cx="12192000" cy="6858000"/>
   <p:notesSz cx="6858000" cy="9144000"/>
   <p:embeddedFontLst>
     <p:embeddedFont>
       <p:font typeface="배달의민족 한나체 Pro" panose="020B0600000101010101" pitchFamily="50" charset="-127"/>
-      <p:regular r:id="rId10"/>
+      <p:regular r:id="rId9"/>
     </p:embeddedFont>
     <p:embeddedFont>
       <p:font typeface="맑은 고딕" panose="020B0503020000020004" pitchFamily="50" charset="-127"/>
-      <p:regular r:id="rId11"/>
-      <p:bold r:id="rId12"/>
+      <p:regular r:id="rId10"/>
+      <p:bold r:id="rId11"/>
     </p:embeddedFont>
     <p:embeddedFont>
       <p:font typeface="배달의민족 주아" panose="02020603020101020101" pitchFamily="18" charset="-127"/>
-      <p:regular r:id="rId13"/>
+      <p:regular r:id="rId12"/>
     </p:embeddedFont>
   </p:embeddedFontLst>
   <p:defaultTextStyle>
@@ -16870,1656 +16869,6 @@
 </p:sld>
 </file>
 
-<file path=ppt/slides/slide7.xml><?xml version="1.0" encoding="utf-8"?>
-<p:sld xmlns:a="http://schemas.openxmlformats.org/drawingml/2006/main" xmlns:r="http://schemas.openxmlformats.org/officeDocument/2006/relationships" xmlns:p="http://schemas.openxmlformats.org/presentationml/2006/main">
-  <p:cSld>
-    <p:spTree>
-      <p:nvGrpSpPr>
-        <p:cNvPr id="1" name=""/>
-        <p:cNvGrpSpPr/>
-        <p:nvPr/>
-      </p:nvGrpSpPr>
-      <p:grpSpPr>
-        <a:xfrm>
-          <a:off x="0" y="0"/>
-          <a:ext cx="0" cy="0"/>
-          <a:chOff x="0" y="0"/>
-          <a:chExt cx="0" cy="0"/>
-        </a:xfrm>
-      </p:grpSpPr>
-      <p:pic>
-        <p:nvPicPr>
-          <p:cNvPr id="67" name="그림 66"/>
-          <p:cNvPicPr>
-            <a:picLocks noChangeAspect="1"/>
-          </p:cNvPicPr>
-          <p:nvPr/>
-        </p:nvPicPr>
-        <p:blipFill>
-          <a:blip r:embed="rId2" cstate="print">
-            <a:extLst>
-              <a:ext uri="{28A0092B-C50C-407E-A947-70E740481C1C}">
-                <a14:useLocalDpi xmlns:a14="http://schemas.microsoft.com/office/drawing/2010/main" val="0"/>
-              </a:ext>
-            </a:extLst>
-          </a:blip>
-          <a:stretch>
-            <a:fillRect/>
-          </a:stretch>
-        </p:blipFill>
-        <p:spPr>
-          <a:xfrm>
-            <a:off x="2120900" y="-489600"/>
-            <a:ext cx="489600" cy="489600"/>
-          </a:xfrm>
-          <a:prstGeom prst="rect">
-            <a:avLst/>
-          </a:prstGeom>
-        </p:spPr>
-      </p:pic>
-      <p:pic>
-        <p:nvPicPr>
-          <p:cNvPr id="68" name="그림 67"/>
-          <p:cNvPicPr>
-            <a:picLocks noChangeAspect="1"/>
-          </p:cNvPicPr>
-          <p:nvPr/>
-        </p:nvPicPr>
-        <p:blipFill>
-          <a:blip r:embed="rId2" cstate="print">
-            <a:extLst>
-              <a:ext uri="{28A0092B-C50C-407E-A947-70E740481C1C}">
-                <a14:useLocalDpi xmlns:a14="http://schemas.microsoft.com/office/drawing/2010/main" val="0"/>
-              </a:ext>
-            </a:extLst>
-          </a:blip>
-          <a:stretch>
-            <a:fillRect/>
-          </a:stretch>
-        </p:blipFill>
-        <p:spPr>
-          <a:xfrm>
-            <a:off x="2120900" y="489600"/>
-            <a:ext cx="489600" cy="489600"/>
-          </a:xfrm>
-          <a:prstGeom prst="rect">
-            <a:avLst/>
-          </a:prstGeom>
-        </p:spPr>
-      </p:pic>
-      <p:pic>
-        <p:nvPicPr>
-          <p:cNvPr id="69" name="그림 68"/>
-          <p:cNvPicPr>
-            <a:picLocks noChangeAspect="1"/>
-          </p:cNvPicPr>
-          <p:nvPr/>
-        </p:nvPicPr>
-        <p:blipFill>
-          <a:blip r:embed="rId2" cstate="print">
-            <a:extLst>
-              <a:ext uri="{28A0092B-C50C-407E-A947-70E740481C1C}">
-                <a14:useLocalDpi xmlns:a14="http://schemas.microsoft.com/office/drawing/2010/main" val="0"/>
-              </a:ext>
-            </a:extLst>
-          </a:blip>
-          <a:stretch>
-            <a:fillRect/>
-          </a:stretch>
-        </p:blipFill>
-        <p:spPr>
-          <a:xfrm>
-            <a:off x="2120900" y="979200"/>
-            <a:ext cx="489600" cy="489600"/>
-          </a:xfrm>
-          <a:prstGeom prst="rect">
-            <a:avLst/>
-          </a:prstGeom>
-        </p:spPr>
-      </p:pic>
-      <p:pic>
-        <p:nvPicPr>
-          <p:cNvPr id="70" name="그림 69"/>
-          <p:cNvPicPr>
-            <a:picLocks noChangeAspect="1"/>
-          </p:cNvPicPr>
-          <p:nvPr/>
-        </p:nvPicPr>
-        <p:blipFill>
-          <a:blip r:embed="rId2" cstate="print">
-            <a:extLst>
-              <a:ext uri="{28A0092B-C50C-407E-A947-70E740481C1C}">
-                <a14:useLocalDpi xmlns:a14="http://schemas.microsoft.com/office/drawing/2010/main" val="0"/>
-              </a:ext>
-            </a:extLst>
-          </a:blip>
-          <a:stretch>
-            <a:fillRect/>
-          </a:stretch>
-        </p:blipFill>
-        <p:spPr>
-          <a:xfrm>
-            <a:off x="2120900" y="1468800"/>
-            <a:ext cx="489600" cy="489600"/>
-          </a:xfrm>
-          <a:prstGeom prst="rect">
-            <a:avLst/>
-          </a:prstGeom>
-        </p:spPr>
-      </p:pic>
-      <p:pic>
-        <p:nvPicPr>
-          <p:cNvPr id="71" name="그림 70"/>
-          <p:cNvPicPr>
-            <a:picLocks noChangeAspect="1"/>
-          </p:cNvPicPr>
-          <p:nvPr/>
-        </p:nvPicPr>
-        <p:blipFill>
-          <a:blip r:embed="rId2" cstate="print">
-            <a:extLst>
-              <a:ext uri="{28A0092B-C50C-407E-A947-70E740481C1C}">
-                <a14:useLocalDpi xmlns:a14="http://schemas.microsoft.com/office/drawing/2010/main" val="0"/>
-              </a:ext>
-            </a:extLst>
-          </a:blip>
-          <a:stretch>
-            <a:fillRect/>
-          </a:stretch>
-        </p:blipFill>
-        <p:spPr>
-          <a:xfrm>
-            <a:off x="2120900" y="1958400"/>
-            <a:ext cx="489600" cy="489600"/>
-          </a:xfrm>
-          <a:prstGeom prst="rect">
-            <a:avLst/>
-          </a:prstGeom>
-        </p:spPr>
-      </p:pic>
-      <p:pic>
-        <p:nvPicPr>
-          <p:cNvPr id="72" name="그림 71"/>
-          <p:cNvPicPr>
-            <a:picLocks noChangeAspect="1"/>
-          </p:cNvPicPr>
-          <p:nvPr/>
-        </p:nvPicPr>
-        <p:blipFill>
-          <a:blip r:embed="rId2" cstate="print">
-            <a:extLst>
-              <a:ext uri="{28A0092B-C50C-407E-A947-70E740481C1C}">
-                <a14:useLocalDpi xmlns:a14="http://schemas.microsoft.com/office/drawing/2010/main" val="0"/>
-              </a:ext>
-            </a:extLst>
-          </a:blip>
-          <a:stretch>
-            <a:fillRect/>
-          </a:stretch>
-        </p:blipFill>
-        <p:spPr>
-          <a:xfrm>
-            <a:off x="2120900" y="2448000"/>
-            <a:ext cx="489600" cy="489600"/>
-          </a:xfrm>
-          <a:prstGeom prst="rect">
-            <a:avLst/>
-          </a:prstGeom>
-        </p:spPr>
-      </p:pic>
-      <p:pic>
-        <p:nvPicPr>
-          <p:cNvPr id="73" name="그림 72"/>
-          <p:cNvPicPr>
-            <a:picLocks noChangeAspect="1"/>
-          </p:cNvPicPr>
-          <p:nvPr/>
-        </p:nvPicPr>
-        <p:blipFill>
-          <a:blip r:embed="rId2" cstate="print">
-            <a:extLst>
-              <a:ext uri="{28A0092B-C50C-407E-A947-70E740481C1C}">
-                <a14:useLocalDpi xmlns:a14="http://schemas.microsoft.com/office/drawing/2010/main" val="0"/>
-              </a:ext>
-            </a:extLst>
-          </a:blip>
-          <a:stretch>
-            <a:fillRect/>
-          </a:stretch>
-        </p:blipFill>
-        <p:spPr>
-          <a:xfrm>
-            <a:off x="2120900" y="2937600"/>
-            <a:ext cx="489600" cy="489600"/>
-          </a:xfrm>
-          <a:prstGeom prst="rect">
-            <a:avLst/>
-          </a:prstGeom>
-        </p:spPr>
-      </p:pic>
-      <p:pic>
-        <p:nvPicPr>
-          <p:cNvPr id="74" name="그림 73"/>
-          <p:cNvPicPr>
-            <a:picLocks noChangeAspect="1"/>
-          </p:cNvPicPr>
-          <p:nvPr/>
-        </p:nvPicPr>
-        <p:blipFill>
-          <a:blip r:embed="rId2" cstate="print">
-            <a:extLst>
-              <a:ext uri="{28A0092B-C50C-407E-A947-70E740481C1C}">
-                <a14:useLocalDpi xmlns:a14="http://schemas.microsoft.com/office/drawing/2010/main" val="0"/>
-              </a:ext>
-            </a:extLst>
-          </a:blip>
-          <a:stretch>
-            <a:fillRect/>
-          </a:stretch>
-        </p:blipFill>
-        <p:spPr>
-          <a:xfrm>
-            <a:off x="2120900" y="3427200"/>
-            <a:ext cx="489600" cy="489600"/>
-          </a:xfrm>
-          <a:prstGeom prst="rect">
-            <a:avLst/>
-          </a:prstGeom>
-        </p:spPr>
-      </p:pic>
-      <p:pic>
-        <p:nvPicPr>
-          <p:cNvPr id="75" name="그림 74"/>
-          <p:cNvPicPr>
-            <a:picLocks noChangeAspect="1"/>
-          </p:cNvPicPr>
-          <p:nvPr/>
-        </p:nvPicPr>
-        <p:blipFill>
-          <a:blip r:embed="rId2" cstate="print">
-            <a:extLst>
-              <a:ext uri="{28A0092B-C50C-407E-A947-70E740481C1C}">
-                <a14:useLocalDpi xmlns:a14="http://schemas.microsoft.com/office/drawing/2010/main" val="0"/>
-              </a:ext>
-            </a:extLst>
-          </a:blip>
-          <a:stretch>
-            <a:fillRect/>
-          </a:stretch>
-        </p:blipFill>
-        <p:spPr>
-          <a:xfrm>
-            <a:off x="2120900" y="3916800"/>
-            <a:ext cx="489600" cy="489600"/>
-          </a:xfrm>
-          <a:prstGeom prst="rect">
-            <a:avLst/>
-          </a:prstGeom>
-        </p:spPr>
-      </p:pic>
-      <p:pic>
-        <p:nvPicPr>
-          <p:cNvPr id="76" name="그림 75"/>
-          <p:cNvPicPr>
-            <a:picLocks noChangeAspect="1"/>
-          </p:cNvPicPr>
-          <p:nvPr/>
-        </p:nvPicPr>
-        <p:blipFill>
-          <a:blip r:embed="rId2" cstate="print">
-            <a:extLst>
-              <a:ext uri="{28A0092B-C50C-407E-A947-70E740481C1C}">
-                <a14:useLocalDpi xmlns:a14="http://schemas.microsoft.com/office/drawing/2010/main" val="0"/>
-              </a:ext>
-            </a:extLst>
-          </a:blip>
-          <a:stretch>
-            <a:fillRect/>
-          </a:stretch>
-        </p:blipFill>
-        <p:spPr>
-          <a:xfrm>
-            <a:off x="2120900" y="4406400"/>
-            <a:ext cx="489600" cy="489600"/>
-          </a:xfrm>
-          <a:prstGeom prst="rect">
-            <a:avLst/>
-          </a:prstGeom>
-        </p:spPr>
-      </p:pic>
-      <p:pic>
-        <p:nvPicPr>
-          <p:cNvPr id="77" name="그림 76"/>
-          <p:cNvPicPr>
-            <a:picLocks noChangeAspect="1"/>
-          </p:cNvPicPr>
-          <p:nvPr/>
-        </p:nvPicPr>
-        <p:blipFill>
-          <a:blip r:embed="rId2" cstate="print">
-            <a:extLst>
-              <a:ext uri="{28A0092B-C50C-407E-A947-70E740481C1C}">
-                <a14:useLocalDpi xmlns:a14="http://schemas.microsoft.com/office/drawing/2010/main" val="0"/>
-              </a:ext>
-            </a:extLst>
-          </a:blip>
-          <a:stretch>
-            <a:fillRect/>
-          </a:stretch>
-        </p:blipFill>
-        <p:spPr>
-          <a:xfrm>
-            <a:off x="2120900" y="4896000"/>
-            <a:ext cx="489600" cy="489600"/>
-          </a:xfrm>
-          <a:prstGeom prst="rect">
-            <a:avLst/>
-          </a:prstGeom>
-        </p:spPr>
-      </p:pic>
-      <p:pic>
-        <p:nvPicPr>
-          <p:cNvPr id="78" name="그림 77"/>
-          <p:cNvPicPr>
-            <a:picLocks noChangeAspect="1"/>
-          </p:cNvPicPr>
-          <p:nvPr/>
-        </p:nvPicPr>
-        <p:blipFill>
-          <a:blip r:embed="rId2" cstate="print">
-            <a:extLst>
-              <a:ext uri="{28A0092B-C50C-407E-A947-70E740481C1C}">
-                <a14:useLocalDpi xmlns:a14="http://schemas.microsoft.com/office/drawing/2010/main" val="0"/>
-              </a:ext>
-            </a:extLst>
-          </a:blip>
-          <a:stretch>
-            <a:fillRect/>
-          </a:stretch>
-        </p:blipFill>
-        <p:spPr>
-          <a:xfrm>
-            <a:off x="2120900" y="5385600"/>
-            <a:ext cx="489600" cy="489600"/>
-          </a:xfrm>
-          <a:prstGeom prst="rect">
-            <a:avLst/>
-          </a:prstGeom>
-        </p:spPr>
-      </p:pic>
-      <p:pic>
-        <p:nvPicPr>
-          <p:cNvPr id="79" name="그림 78"/>
-          <p:cNvPicPr>
-            <a:picLocks noChangeAspect="1"/>
-          </p:cNvPicPr>
-          <p:nvPr/>
-        </p:nvPicPr>
-        <p:blipFill>
-          <a:blip r:embed="rId2" cstate="print">
-            <a:extLst>
-              <a:ext uri="{28A0092B-C50C-407E-A947-70E740481C1C}">
-                <a14:useLocalDpi xmlns:a14="http://schemas.microsoft.com/office/drawing/2010/main" val="0"/>
-              </a:ext>
-            </a:extLst>
-          </a:blip>
-          <a:stretch>
-            <a:fillRect/>
-          </a:stretch>
-        </p:blipFill>
-        <p:spPr>
-          <a:xfrm>
-            <a:off x="2120900" y="6364800"/>
-            <a:ext cx="489600" cy="489600"/>
-          </a:xfrm>
-          <a:prstGeom prst="rect">
-            <a:avLst/>
-          </a:prstGeom>
-        </p:spPr>
-      </p:pic>
-      <p:pic>
-        <p:nvPicPr>
-          <p:cNvPr id="80" name="그림 79"/>
-          <p:cNvPicPr>
-            <a:picLocks noChangeAspect="1"/>
-          </p:cNvPicPr>
-          <p:nvPr/>
-        </p:nvPicPr>
-        <p:blipFill>
-          <a:blip r:embed="rId2" cstate="print">
-            <a:extLst>
-              <a:ext uri="{28A0092B-C50C-407E-A947-70E740481C1C}">
-                <a14:useLocalDpi xmlns:a14="http://schemas.microsoft.com/office/drawing/2010/main" val="0"/>
-              </a:ext>
-            </a:extLst>
-          </a:blip>
-          <a:stretch>
-            <a:fillRect/>
-          </a:stretch>
-        </p:blipFill>
-        <p:spPr>
-          <a:xfrm>
-            <a:off x="2610500" y="-489600"/>
-            <a:ext cx="489600" cy="489600"/>
-          </a:xfrm>
-          <a:prstGeom prst="rect">
-            <a:avLst/>
-          </a:prstGeom>
-        </p:spPr>
-      </p:pic>
-      <p:pic>
-        <p:nvPicPr>
-          <p:cNvPr id="81" name="그림 80"/>
-          <p:cNvPicPr>
-            <a:picLocks noChangeAspect="1"/>
-          </p:cNvPicPr>
-          <p:nvPr/>
-        </p:nvPicPr>
-        <p:blipFill>
-          <a:blip r:embed="rId2" cstate="print">
-            <a:extLst>
-              <a:ext uri="{28A0092B-C50C-407E-A947-70E740481C1C}">
-                <a14:useLocalDpi xmlns:a14="http://schemas.microsoft.com/office/drawing/2010/main" val="0"/>
-              </a:ext>
-            </a:extLst>
-          </a:blip>
-          <a:stretch>
-            <a:fillRect/>
-          </a:stretch>
-        </p:blipFill>
-        <p:spPr>
-          <a:xfrm>
-            <a:off x="3100100" y="-489600"/>
-            <a:ext cx="489600" cy="489600"/>
-          </a:xfrm>
-          <a:prstGeom prst="rect">
-            <a:avLst/>
-          </a:prstGeom>
-        </p:spPr>
-      </p:pic>
-      <p:pic>
-        <p:nvPicPr>
-          <p:cNvPr id="82" name="그림 81"/>
-          <p:cNvPicPr>
-            <a:picLocks noChangeAspect="1"/>
-          </p:cNvPicPr>
-          <p:nvPr/>
-        </p:nvPicPr>
-        <p:blipFill>
-          <a:blip r:embed="rId2" cstate="print">
-            <a:extLst>
-              <a:ext uri="{28A0092B-C50C-407E-A947-70E740481C1C}">
-                <a14:useLocalDpi xmlns:a14="http://schemas.microsoft.com/office/drawing/2010/main" val="0"/>
-              </a:ext>
-            </a:extLst>
-          </a:blip>
-          <a:stretch>
-            <a:fillRect/>
-          </a:stretch>
-        </p:blipFill>
-        <p:spPr>
-          <a:xfrm>
-            <a:off x="3589700" y="-489600"/>
-            <a:ext cx="489600" cy="489600"/>
-          </a:xfrm>
-          <a:prstGeom prst="rect">
-            <a:avLst/>
-          </a:prstGeom>
-        </p:spPr>
-      </p:pic>
-      <p:pic>
-        <p:nvPicPr>
-          <p:cNvPr id="83" name="그림 82"/>
-          <p:cNvPicPr>
-            <a:picLocks noChangeAspect="1"/>
-          </p:cNvPicPr>
-          <p:nvPr/>
-        </p:nvPicPr>
-        <p:blipFill>
-          <a:blip r:embed="rId2" cstate="print">
-            <a:extLst>
-              <a:ext uri="{28A0092B-C50C-407E-A947-70E740481C1C}">
-                <a14:useLocalDpi xmlns:a14="http://schemas.microsoft.com/office/drawing/2010/main" val="0"/>
-              </a:ext>
-            </a:extLst>
-          </a:blip>
-          <a:stretch>
-            <a:fillRect/>
-          </a:stretch>
-        </p:blipFill>
-        <p:spPr>
-          <a:xfrm>
-            <a:off x="4079300" y="-489600"/>
-            <a:ext cx="489600" cy="489600"/>
-          </a:xfrm>
-          <a:prstGeom prst="rect">
-            <a:avLst/>
-          </a:prstGeom>
-        </p:spPr>
-      </p:pic>
-      <p:pic>
-        <p:nvPicPr>
-          <p:cNvPr id="84" name="그림 83"/>
-          <p:cNvPicPr>
-            <a:picLocks noChangeAspect="1"/>
-          </p:cNvPicPr>
-          <p:nvPr/>
-        </p:nvPicPr>
-        <p:blipFill>
-          <a:blip r:embed="rId2" cstate="print">
-            <a:extLst>
-              <a:ext uri="{28A0092B-C50C-407E-A947-70E740481C1C}">
-                <a14:useLocalDpi xmlns:a14="http://schemas.microsoft.com/office/drawing/2010/main" val="0"/>
-              </a:ext>
-            </a:extLst>
-          </a:blip>
-          <a:stretch>
-            <a:fillRect/>
-          </a:stretch>
-        </p:blipFill>
-        <p:spPr>
-          <a:xfrm>
-            <a:off x="4568900" y="-489600"/>
-            <a:ext cx="489600" cy="489600"/>
-          </a:xfrm>
-          <a:prstGeom prst="rect">
-            <a:avLst/>
-          </a:prstGeom>
-        </p:spPr>
-      </p:pic>
-      <p:pic>
-        <p:nvPicPr>
-          <p:cNvPr id="85" name="그림 84"/>
-          <p:cNvPicPr>
-            <a:picLocks noChangeAspect="1"/>
-          </p:cNvPicPr>
-          <p:nvPr/>
-        </p:nvPicPr>
-        <p:blipFill>
-          <a:blip r:embed="rId2" cstate="print">
-            <a:extLst>
-              <a:ext uri="{28A0092B-C50C-407E-A947-70E740481C1C}">
-                <a14:useLocalDpi xmlns:a14="http://schemas.microsoft.com/office/drawing/2010/main" val="0"/>
-              </a:ext>
-            </a:extLst>
-          </a:blip>
-          <a:stretch>
-            <a:fillRect/>
-          </a:stretch>
-        </p:blipFill>
-        <p:spPr>
-          <a:xfrm>
-            <a:off x="5058500" y="-489600"/>
-            <a:ext cx="489600" cy="489600"/>
-          </a:xfrm>
-          <a:prstGeom prst="rect">
-            <a:avLst/>
-          </a:prstGeom>
-        </p:spPr>
-      </p:pic>
-      <p:pic>
-        <p:nvPicPr>
-          <p:cNvPr id="86" name="그림 85"/>
-          <p:cNvPicPr>
-            <a:picLocks noChangeAspect="1"/>
-          </p:cNvPicPr>
-          <p:nvPr/>
-        </p:nvPicPr>
-        <p:blipFill>
-          <a:blip r:embed="rId2" cstate="print">
-            <a:extLst>
-              <a:ext uri="{28A0092B-C50C-407E-A947-70E740481C1C}">
-                <a14:useLocalDpi xmlns:a14="http://schemas.microsoft.com/office/drawing/2010/main" val="0"/>
-              </a:ext>
-            </a:extLst>
-          </a:blip>
-          <a:stretch>
-            <a:fillRect/>
-          </a:stretch>
-        </p:blipFill>
-        <p:spPr>
-          <a:xfrm>
-            <a:off x="5548100" y="-489600"/>
-            <a:ext cx="489600" cy="489600"/>
-          </a:xfrm>
-          <a:prstGeom prst="rect">
-            <a:avLst/>
-          </a:prstGeom>
-        </p:spPr>
-      </p:pic>
-      <p:pic>
-        <p:nvPicPr>
-          <p:cNvPr id="87" name="그림 86"/>
-          <p:cNvPicPr>
-            <a:picLocks noChangeAspect="1"/>
-          </p:cNvPicPr>
-          <p:nvPr/>
-        </p:nvPicPr>
-        <p:blipFill>
-          <a:blip r:embed="rId2" cstate="print">
-            <a:extLst>
-              <a:ext uri="{28A0092B-C50C-407E-A947-70E740481C1C}">
-                <a14:useLocalDpi xmlns:a14="http://schemas.microsoft.com/office/drawing/2010/main" val="0"/>
-              </a:ext>
-            </a:extLst>
-          </a:blip>
-          <a:stretch>
-            <a:fillRect/>
-          </a:stretch>
-        </p:blipFill>
-        <p:spPr>
-          <a:xfrm>
-            <a:off x="6037700" y="-489600"/>
-            <a:ext cx="489600" cy="489600"/>
-          </a:xfrm>
-          <a:prstGeom prst="rect">
-            <a:avLst/>
-          </a:prstGeom>
-        </p:spPr>
-      </p:pic>
-      <p:pic>
-        <p:nvPicPr>
-          <p:cNvPr id="88" name="그림 87"/>
-          <p:cNvPicPr>
-            <a:picLocks noChangeAspect="1"/>
-          </p:cNvPicPr>
-          <p:nvPr/>
-        </p:nvPicPr>
-        <p:blipFill>
-          <a:blip r:embed="rId2" cstate="print">
-            <a:extLst>
-              <a:ext uri="{28A0092B-C50C-407E-A947-70E740481C1C}">
-                <a14:useLocalDpi xmlns:a14="http://schemas.microsoft.com/office/drawing/2010/main" val="0"/>
-              </a:ext>
-            </a:extLst>
-          </a:blip>
-          <a:stretch>
-            <a:fillRect/>
-          </a:stretch>
-        </p:blipFill>
-        <p:spPr>
-          <a:xfrm>
-            <a:off x="6527300" y="-489600"/>
-            <a:ext cx="489600" cy="489600"/>
-          </a:xfrm>
-          <a:prstGeom prst="rect">
-            <a:avLst/>
-          </a:prstGeom>
-        </p:spPr>
-      </p:pic>
-      <p:pic>
-        <p:nvPicPr>
-          <p:cNvPr id="89" name="그림 88"/>
-          <p:cNvPicPr>
-            <a:picLocks noChangeAspect="1"/>
-          </p:cNvPicPr>
-          <p:nvPr/>
-        </p:nvPicPr>
-        <p:blipFill>
-          <a:blip r:embed="rId2" cstate="print">
-            <a:extLst>
-              <a:ext uri="{28A0092B-C50C-407E-A947-70E740481C1C}">
-                <a14:useLocalDpi xmlns:a14="http://schemas.microsoft.com/office/drawing/2010/main" val="0"/>
-              </a:ext>
-            </a:extLst>
-          </a:blip>
-          <a:stretch>
-            <a:fillRect/>
-          </a:stretch>
-        </p:blipFill>
-        <p:spPr>
-          <a:xfrm>
-            <a:off x="7016900" y="-489600"/>
-            <a:ext cx="489600" cy="489600"/>
-          </a:xfrm>
-          <a:prstGeom prst="rect">
-            <a:avLst/>
-          </a:prstGeom>
-        </p:spPr>
-      </p:pic>
-      <p:pic>
-        <p:nvPicPr>
-          <p:cNvPr id="90" name="그림 89"/>
-          <p:cNvPicPr>
-            <a:picLocks noChangeAspect="1"/>
-          </p:cNvPicPr>
-          <p:nvPr/>
-        </p:nvPicPr>
-        <p:blipFill>
-          <a:blip r:embed="rId2" cstate="print">
-            <a:extLst>
-              <a:ext uri="{28A0092B-C50C-407E-A947-70E740481C1C}">
-                <a14:useLocalDpi xmlns:a14="http://schemas.microsoft.com/office/drawing/2010/main" val="0"/>
-              </a:ext>
-            </a:extLst>
-          </a:blip>
-          <a:stretch>
-            <a:fillRect/>
-          </a:stretch>
-        </p:blipFill>
-        <p:spPr>
-          <a:xfrm>
-            <a:off x="7506500" y="-489600"/>
-            <a:ext cx="489600" cy="489600"/>
-          </a:xfrm>
-          <a:prstGeom prst="rect">
-            <a:avLst/>
-          </a:prstGeom>
-        </p:spPr>
-      </p:pic>
-      <p:pic>
-        <p:nvPicPr>
-          <p:cNvPr id="91" name="그림 90"/>
-          <p:cNvPicPr>
-            <a:picLocks noChangeAspect="1"/>
-          </p:cNvPicPr>
-          <p:nvPr/>
-        </p:nvPicPr>
-        <p:blipFill>
-          <a:blip r:embed="rId2" cstate="print">
-            <a:extLst>
-              <a:ext uri="{28A0092B-C50C-407E-A947-70E740481C1C}">
-                <a14:useLocalDpi xmlns:a14="http://schemas.microsoft.com/office/drawing/2010/main" val="0"/>
-              </a:ext>
-            </a:extLst>
-          </a:blip>
-          <a:stretch>
-            <a:fillRect/>
-          </a:stretch>
-        </p:blipFill>
-        <p:spPr>
-          <a:xfrm>
-            <a:off x="7996100" y="-489600"/>
-            <a:ext cx="489600" cy="489600"/>
-          </a:xfrm>
-          <a:prstGeom prst="rect">
-            <a:avLst/>
-          </a:prstGeom>
-        </p:spPr>
-      </p:pic>
-      <p:pic>
-        <p:nvPicPr>
-          <p:cNvPr id="92" name="그림 91"/>
-          <p:cNvPicPr>
-            <a:picLocks noChangeAspect="1"/>
-          </p:cNvPicPr>
-          <p:nvPr/>
-        </p:nvPicPr>
-        <p:blipFill>
-          <a:blip r:embed="rId2" cstate="print">
-            <a:extLst>
-              <a:ext uri="{28A0092B-C50C-407E-A947-70E740481C1C}">
-                <a14:useLocalDpi xmlns:a14="http://schemas.microsoft.com/office/drawing/2010/main" val="0"/>
-              </a:ext>
-            </a:extLst>
-          </a:blip>
-          <a:stretch>
-            <a:fillRect/>
-          </a:stretch>
-        </p:blipFill>
-        <p:spPr>
-          <a:xfrm>
-            <a:off x="8485700" y="-489600"/>
-            <a:ext cx="489600" cy="489600"/>
-          </a:xfrm>
-          <a:prstGeom prst="rect">
-            <a:avLst/>
-          </a:prstGeom>
-        </p:spPr>
-      </p:pic>
-      <p:pic>
-        <p:nvPicPr>
-          <p:cNvPr id="93" name="그림 92"/>
-          <p:cNvPicPr>
-            <a:picLocks noChangeAspect="1"/>
-          </p:cNvPicPr>
-          <p:nvPr/>
-        </p:nvPicPr>
-        <p:blipFill>
-          <a:blip r:embed="rId2" cstate="print">
-            <a:extLst>
-              <a:ext uri="{28A0092B-C50C-407E-A947-70E740481C1C}">
-                <a14:useLocalDpi xmlns:a14="http://schemas.microsoft.com/office/drawing/2010/main" val="0"/>
-              </a:ext>
-            </a:extLst>
-          </a:blip>
-          <a:stretch>
-            <a:fillRect/>
-          </a:stretch>
-        </p:blipFill>
-        <p:spPr>
-          <a:xfrm>
-            <a:off x="8485700" y="489600"/>
-            <a:ext cx="489600" cy="489600"/>
-          </a:xfrm>
-          <a:prstGeom prst="rect">
-            <a:avLst/>
-          </a:prstGeom>
-        </p:spPr>
-      </p:pic>
-      <p:pic>
-        <p:nvPicPr>
-          <p:cNvPr id="94" name="그림 93"/>
-          <p:cNvPicPr>
-            <a:picLocks noChangeAspect="1"/>
-          </p:cNvPicPr>
-          <p:nvPr/>
-        </p:nvPicPr>
-        <p:blipFill>
-          <a:blip r:embed="rId2" cstate="print">
-            <a:extLst>
-              <a:ext uri="{28A0092B-C50C-407E-A947-70E740481C1C}">
-                <a14:useLocalDpi xmlns:a14="http://schemas.microsoft.com/office/drawing/2010/main" val="0"/>
-              </a:ext>
-            </a:extLst>
-          </a:blip>
-          <a:stretch>
-            <a:fillRect/>
-          </a:stretch>
-        </p:blipFill>
-        <p:spPr>
-          <a:xfrm>
-            <a:off x="8485700" y="979200"/>
-            <a:ext cx="489600" cy="489600"/>
-          </a:xfrm>
-          <a:prstGeom prst="rect">
-            <a:avLst/>
-          </a:prstGeom>
-        </p:spPr>
-      </p:pic>
-      <p:pic>
-        <p:nvPicPr>
-          <p:cNvPr id="95" name="그림 94"/>
-          <p:cNvPicPr>
-            <a:picLocks noChangeAspect="1"/>
-          </p:cNvPicPr>
-          <p:nvPr/>
-        </p:nvPicPr>
-        <p:blipFill>
-          <a:blip r:embed="rId2" cstate="print">
-            <a:extLst>
-              <a:ext uri="{28A0092B-C50C-407E-A947-70E740481C1C}">
-                <a14:useLocalDpi xmlns:a14="http://schemas.microsoft.com/office/drawing/2010/main" val="0"/>
-              </a:ext>
-            </a:extLst>
-          </a:blip>
-          <a:stretch>
-            <a:fillRect/>
-          </a:stretch>
-        </p:blipFill>
-        <p:spPr>
-          <a:xfrm>
-            <a:off x="8485700" y="1468800"/>
-            <a:ext cx="489600" cy="489600"/>
-          </a:xfrm>
-          <a:prstGeom prst="rect">
-            <a:avLst/>
-          </a:prstGeom>
-        </p:spPr>
-      </p:pic>
-      <p:pic>
-        <p:nvPicPr>
-          <p:cNvPr id="96" name="그림 95"/>
-          <p:cNvPicPr>
-            <a:picLocks noChangeAspect="1"/>
-          </p:cNvPicPr>
-          <p:nvPr/>
-        </p:nvPicPr>
-        <p:blipFill>
-          <a:blip r:embed="rId2" cstate="print">
-            <a:extLst>
-              <a:ext uri="{28A0092B-C50C-407E-A947-70E740481C1C}">
-                <a14:useLocalDpi xmlns:a14="http://schemas.microsoft.com/office/drawing/2010/main" val="0"/>
-              </a:ext>
-            </a:extLst>
-          </a:blip>
-          <a:stretch>
-            <a:fillRect/>
-          </a:stretch>
-        </p:blipFill>
-        <p:spPr>
-          <a:xfrm>
-            <a:off x="8485700" y="1958400"/>
-            <a:ext cx="489600" cy="489600"/>
-          </a:xfrm>
-          <a:prstGeom prst="rect">
-            <a:avLst/>
-          </a:prstGeom>
-        </p:spPr>
-      </p:pic>
-      <p:pic>
-        <p:nvPicPr>
-          <p:cNvPr id="97" name="그림 96"/>
-          <p:cNvPicPr>
-            <a:picLocks noChangeAspect="1"/>
-          </p:cNvPicPr>
-          <p:nvPr/>
-        </p:nvPicPr>
-        <p:blipFill>
-          <a:blip r:embed="rId2" cstate="print">
-            <a:extLst>
-              <a:ext uri="{28A0092B-C50C-407E-A947-70E740481C1C}">
-                <a14:useLocalDpi xmlns:a14="http://schemas.microsoft.com/office/drawing/2010/main" val="0"/>
-              </a:ext>
-            </a:extLst>
-          </a:blip>
-          <a:stretch>
-            <a:fillRect/>
-          </a:stretch>
-        </p:blipFill>
-        <p:spPr>
-          <a:xfrm>
-            <a:off x="8485700" y="2448000"/>
-            <a:ext cx="489600" cy="489600"/>
-          </a:xfrm>
-          <a:prstGeom prst="rect">
-            <a:avLst/>
-          </a:prstGeom>
-        </p:spPr>
-      </p:pic>
-      <p:pic>
-        <p:nvPicPr>
-          <p:cNvPr id="98" name="그림 97"/>
-          <p:cNvPicPr>
-            <a:picLocks noChangeAspect="1"/>
-          </p:cNvPicPr>
-          <p:nvPr/>
-        </p:nvPicPr>
-        <p:blipFill>
-          <a:blip r:embed="rId2" cstate="print">
-            <a:extLst>
-              <a:ext uri="{28A0092B-C50C-407E-A947-70E740481C1C}">
-                <a14:useLocalDpi xmlns:a14="http://schemas.microsoft.com/office/drawing/2010/main" val="0"/>
-              </a:ext>
-            </a:extLst>
-          </a:blip>
-          <a:stretch>
-            <a:fillRect/>
-          </a:stretch>
-        </p:blipFill>
-        <p:spPr>
-          <a:xfrm>
-            <a:off x="8485700" y="2937600"/>
-            <a:ext cx="489600" cy="489600"/>
-          </a:xfrm>
-          <a:prstGeom prst="rect">
-            <a:avLst/>
-          </a:prstGeom>
-        </p:spPr>
-      </p:pic>
-      <p:pic>
-        <p:nvPicPr>
-          <p:cNvPr id="99" name="그림 98"/>
-          <p:cNvPicPr>
-            <a:picLocks noChangeAspect="1"/>
-          </p:cNvPicPr>
-          <p:nvPr/>
-        </p:nvPicPr>
-        <p:blipFill>
-          <a:blip r:embed="rId2" cstate="print">
-            <a:extLst>
-              <a:ext uri="{28A0092B-C50C-407E-A947-70E740481C1C}">
-                <a14:useLocalDpi xmlns:a14="http://schemas.microsoft.com/office/drawing/2010/main" val="0"/>
-              </a:ext>
-            </a:extLst>
-          </a:blip>
-          <a:stretch>
-            <a:fillRect/>
-          </a:stretch>
-        </p:blipFill>
-        <p:spPr>
-          <a:xfrm>
-            <a:off x="8485700" y="3427200"/>
-            <a:ext cx="489600" cy="489600"/>
-          </a:xfrm>
-          <a:prstGeom prst="rect">
-            <a:avLst/>
-          </a:prstGeom>
-        </p:spPr>
-      </p:pic>
-      <p:pic>
-        <p:nvPicPr>
-          <p:cNvPr id="100" name="그림 99"/>
-          <p:cNvPicPr>
-            <a:picLocks noChangeAspect="1"/>
-          </p:cNvPicPr>
-          <p:nvPr/>
-        </p:nvPicPr>
-        <p:blipFill>
-          <a:blip r:embed="rId2" cstate="print">
-            <a:extLst>
-              <a:ext uri="{28A0092B-C50C-407E-A947-70E740481C1C}">
-                <a14:useLocalDpi xmlns:a14="http://schemas.microsoft.com/office/drawing/2010/main" val="0"/>
-              </a:ext>
-            </a:extLst>
-          </a:blip>
-          <a:stretch>
-            <a:fillRect/>
-          </a:stretch>
-        </p:blipFill>
-        <p:spPr>
-          <a:xfrm>
-            <a:off x="8485700" y="3916800"/>
-            <a:ext cx="489600" cy="489600"/>
-          </a:xfrm>
-          <a:prstGeom prst="rect">
-            <a:avLst/>
-          </a:prstGeom>
-        </p:spPr>
-      </p:pic>
-      <p:pic>
-        <p:nvPicPr>
-          <p:cNvPr id="101" name="그림 100"/>
-          <p:cNvPicPr>
-            <a:picLocks noChangeAspect="1"/>
-          </p:cNvPicPr>
-          <p:nvPr/>
-        </p:nvPicPr>
-        <p:blipFill>
-          <a:blip r:embed="rId2" cstate="print">
-            <a:extLst>
-              <a:ext uri="{28A0092B-C50C-407E-A947-70E740481C1C}">
-                <a14:useLocalDpi xmlns:a14="http://schemas.microsoft.com/office/drawing/2010/main" val="0"/>
-              </a:ext>
-            </a:extLst>
-          </a:blip>
-          <a:stretch>
-            <a:fillRect/>
-          </a:stretch>
-        </p:blipFill>
-        <p:spPr>
-          <a:xfrm>
-            <a:off x="8485700" y="4406400"/>
-            <a:ext cx="489600" cy="489600"/>
-          </a:xfrm>
-          <a:prstGeom prst="rect">
-            <a:avLst/>
-          </a:prstGeom>
-        </p:spPr>
-      </p:pic>
-      <p:pic>
-        <p:nvPicPr>
-          <p:cNvPr id="102" name="그림 101"/>
-          <p:cNvPicPr>
-            <a:picLocks noChangeAspect="1"/>
-          </p:cNvPicPr>
-          <p:nvPr/>
-        </p:nvPicPr>
-        <p:blipFill>
-          <a:blip r:embed="rId2" cstate="print">
-            <a:extLst>
-              <a:ext uri="{28A0092B-C50C-407E-A947-70E740481C1C}">
-                <a14:useLocalDpi xmlns:a14="http://schemas.microsoft.com/office/drawing/2010/main" val="0"/>
-              </a:ext>
-            </a:extLst>
-          </a:blip>
-          <a:stretch>
-            <a:fillRect/>
-          </a:stretch>
-        </p:blipFill>
-        <p:spPr>
-          <a:xfrm>
-            <a:off x="8485700" y="4896000"/>
-            <a:ext cx="489600" cy="489600"/>
-          </a:xfrm>
-          <a:prstGeom prst="rect">
-            <a:avLst/>
-          </a:prstGeom>
-        </p:spPr>
-      </p:pic>
-      <p:pic>
-        <p:nvPicPr>
-          <p:cNvPr id="103" name="그림 102"/>
-          <p:cNvPicPr>
-            <a:picLocks noChangeAspect="1"/>
-          </p:cNvPicPr>
-          <p:nvPr/>
-        </p:nvPicPr>
-        <p:blipFill>
-          <a:blip r:embed="rId2" cstate="print">
-            <a:extLst>
-              <a:ext uri="{28A0092B-C50C-407E-A947-70E740481C1C}">
-                <a14:useLocalDpi xmlns:a14="http://schemas.microsoft.com/office/drawing/2010/main" val="0"/>
-              </a:ext>
-            </a:extLst>
-          </a:blip>
-          <a:stretch>
-            <a:fillRect/>
-          </a:stretch>
-        </p:blipFill>
-        <p:spPr>
-          <a:xfrm>
-            <a:off x="8485700" y="5385600"/>
-            <a:ext cx="489600" cy="489600"/>
-          </a:xfrm>
-          <a:prstGeom prst="rect">
-            <a:avLst/>
-          </a:prstGeom>
-        </p:spPr>
-      </p:pic>
-      <p:pic>
-        <p:nvPicPr>
-          <p:cNvPr id="104" name="그림 103"/>
-          <p:cNvPicPr>
-            <a:picLocks noChangeAspect="1"/>
-          </p:cNvPicPr>
-          <p:nvPr/>
-        </p:nvPicPr>
-        <p:blipFill>
-          <a:blip r:embed="rId2" cstate="print">
-            <a:extLst>
-              <a:ext uri="{28A0092B-C50C-407E-A947-70E740481C1C}">
-                <a14:useLocalDpi xmlns:a14="http://schemas.microsoft.com/office/drawing/2010/main" val="0"/>
-              </a:ext>
-            </a:extLst>
-          </a:blip>
-          <a:stretch>
-            <a:fillRect/>
-          </a:stretch>
-        </p:blipFill>
-        <p:spPr>
-          <a:xfrm>
-            <a:off x="8485700" y="6364800"/>
-            <a:ext cx="489600" cy="489600"/>
-          </a:xfrm>
-          <a:prstGeom prst="rect">
-            <a:avLst/>
-          </a:prstGeom>
-        </p:spPr>
-      </p:pic>
-      <p:pic>
-        <p:nvPicPr>
-          <p:cNvPr id="105" name="그림 104"/>
-          <p:cNvPicPr>
-            <a:picLocks noChangeAspect="1"/>
-          </p:cNvPicPr>
-          <p:nvPr/>
-        </p:nvPicPr>
-        <p:blipFill>
-          <a:blip r:embed="rId2" cstate="print">
-            <a:extLst>
-              <a:ext uri="{28A0092B-C50C-407E-A947-70E740481C1C}">
-                <a14:useLocalDpi xmlns:a14="http://schemas.microsoft.com/office/drawing/2010/main" val="0"/>
-              </a:ext>
-            </a:extLst>
-          </a:blip>
-          <a:stretch>
-            <a:fillRect/>
-          </a:stretch>
-        </p:blipFill>
-        <p:spPr>
-          <a:xfrm>
-            <a:off x="2610500" y="6364800"/>
-            <a:ext cx="489600" cy="489600"/>
-          </a:xfrm>
-          <a:prstGeom prst="rect">
-            <a:avLst/>
-          </a:prstGeom>
-        </p:spPr>
-      </p:pic>
-      <p:pic>
-        <p:nvPicPr>
-          <p:cNvPr id="106" name="그림 105"/>
-          <p:cNvPicPr>
-            <a:picLocks noChangeAspect="1"/>
-          </p:cNvPicPr>
-          <p:nvPr/>
-        </p:nvPicPr>
-        <p:blipFill>
-          <a:blip r:embed="rId2" cstate="print">
-            <a:extLst>
-              <a:ext uri="{28A0092B-C50C-407E-A947-70E740481C1C}">
-                <a14:useLocalDpi xmlns:a14="http://schemas.microsoft.com/office/drawing/2010/main" val="0"/>
-              </a:ext>
-            </a:extLst>
-          </a:blip>
-          <a:stretch>
-            <a:fillRect/>
-          </a:stretch>
-        </p:blipFill>
-        <p:spPr>
-          <a:xfrm>
-            <a:off x="3100100" y="6364800"/>
-            <a:ext cx="489600" cy="489600"/>
-          </a:xfrm>
-          <a:prstGeom prst="rect">
-            <a:avLst/>
-          </a:prstGeom>
-        </p:spPr>
-      </p:pic>
-      <p:pic>
-        <p:nvPicPr>
-          <p:cNvPr id="107" name="그림 106"/>
-          <p:cNvPicPr>
-            <a:picLocks noChangeAspect="1"/>
-          </p:cNvPicPr>
-          <p:nvPr/>
-        </p:nvPicPr>
-        <p:blipFill>
-          <a:blip r:embed="rId2" cstate="print">
-            <a:extLst>
-              <a:ext uri="{28A0092B-C50C-407E-A947-70E740481C1C}">
-                <a14:useLocalDpi xmlns:a14="http://schemas.microsoft.com/office/drawing/2010/main" val="0"/>
-              </a:ext>
-            </a:extLst>
-          </a:blip>
-          <a:stretch>
-            <a:fillRect/>
-          </a:stretch>
-        </p:blipFill>
-        <p:spPr>
-          <a:xfrm>
-            <a:off x="3589700" y="6364800"/>
-            <a:ext cx="489600" cy="489600"/>
-          </a:xfrm>
-          <a:prstGeom prst="rect">
-            <a:avLst/>
-          </a:prstGeom>
-        </p:spPr>
-      </p:pic>
-      <p:pic>
-        <p:nvPicPr>
-          <p:cNvPr id="108" name="그림 107"/>
-          <p:cNvPicPr>
-            <a:picLocks noChangeAspect="1"/>
-          </p:cNvPicPr>
-          <p:nvPr/>
-        </p:nvPicPr>
-        <p:blipFill>
-          <a:blip r:embed="rId2" cstate="print">
-            <a:extLst>
-              <a:ext uri="{28A0092B-C50C-407E-A947-70E740481C1C}">
-                <a14:useLocalDpi xmlns:a14="http://schemas.microsoft.com/office/drawing/2010/main" val="0"/>
-              </a:ext>
-            </a:extLst>
-          </a:blip>
-          <a:stretch>
-            <a:fillRect/>
-          </a:stretch>
-        </p:blipFill>
-        <p:spPr>
-          <a:xfrm>
-            <a:off x="4079300" y="6364800"/>
-            <a:ext cx="489600" cy="489600"/>
-          </a:xfrm>
-          <a:prstGeom prst="rect">
-            <a:avLst/>
-          </a:prstGeom>
-        </p:spPr>
-      </p:pic>
-      <p:pic>
-        <p:nvPicPr>
-          <p:cNvPr id="109" name="그림 108"/>
-          <p:cNvPicPr>
-            <a:picLocks noChangeAspect="1"/>
-          </p:cNvPicPr>
-          <p:nvPr/>
-        </p:nvPicPr>
-        <p:blipFill>
-          <a:blip r:embed="rId2" cstate="print">
-            <a:extLst>
-              <a:ext uri="{28A0092B-C50C-407E-A947-70E740481C1C}">
-                <a14:useLocalDpi xmlns:a14="http://schemas.microsoft.com/office/drawing/2010/main" val="0"/>
-              </a:ext>
-            </a:extLst>
-          </a:blip>
-          <a:stretch>
-            <a:fillRect/>
-          </a:stretch>
-        </p:blipFill>
-        <p:spPr>
-          <a:xfrm>
-            <a:off x="4568900" y="6364800"/>
-            <a:ext cx="489600" cy="489600"/>
-          </a:xfrm>
-          <a:prstGeom prst="rect">
-            <a:avLst/>
-          </a:prstGeom>
-        </p:spPr>
-      </p:pic>
-      <p:pic>
-        <p:nvPicPr>
-          <p:cNvPr id="110" name="그림 109"/>
-          <p:cNvPicPr>
-            <a:picLocks noChangeAspect="1"/>
-          </p:cNvPicPr>
-          <p:nvPr/>
-        </p:nvPicPr>
-        <p:blipFill>
-          <a:blip r:embed="rId2" cstate="print">
-            <a:extLst>
-              <a:ext uri="{28A0092B-C50C-407E-A947-70E740481C1C}">
-                <a14:useLocalDpi xmlns:a14="http://schemas.microsoft.com/office/drawing/2010/main" val="0"/>
-              </a:ext>
-            </a:extLst>
-          </a:blip>
-          <a:stretch>
-            <a:fillRect/>
-          </a:stretch>
-        </p:blipFill>
-        <p:spPr>
-          <a:xfrm>
-            <a:off x="5058500" y="6364800"/>
-            <a:ext cx="489600" cy="489600"/>
-          </a:xfrm>
-          <a:prstGeom prst="rect">
-            <a:avLst/>
-          </a:prstGeom>
-        </p:spPr>
-      </p:pic>
-      <p:pic>
-        <p:nvPicPr>
-          <p:cNvPr id="111" name="그림 110"/>
-          <p:cNvPicPr>
-            <a:picLocks noChangeAspect="1"/>
-          </p:cNvPicPr>
-          <p:nvPr/>
-        </p:nvPicPr>
-        <p:blipFill>
-          <a:blip r:embed="rId2" cstate="print">
-            <a:extLst>
-              <a:ext uri="{28A0092B-C50C-407E-A947-70E740481C1C}">
-                <a14:useLocalDpi xmlns:a14="http://schemas.microsoft.com/office/drawing/2010/main" val="0"/>
-              </a:ext>
-            </a:extLst>
-          </a:blip>
-          <a:stretch>
-            <a:fillRect/>
-          </a:stretch>
-        </p:blipFill>
-        <p:spPr>
-          <a:xfrm>
-            <a:off x="5548100" y="6364800"/>
-            <a:ext cx="489600" cy="489600"/>
-          </a:xfrm>
-          <a:prstGeom prst="rect">
-            <a:avLst/>
-          </a:prstGeom>
-        </p:spPr>
-      </p:pic>
-      <p:pic>
-        <p:nvPicPr>
-          <p:cNvPr id="112" name="그림 111"/>
-          <p:cNvPicPr>
-            <a:picLocks noChangeAspect="1"/>
-          </p:cNvPicPr>
-          <p:nvPr/>
-        </p:nvPicPr>
-        <p:blipFill>
-          <a:blip r:embed="rId2" cstate="print">
-            <a:extLst>
-              <a:ext uri="{28A0092B-C50C-407E-A947-70E740481C1C}">
-                <a14:useLocalDpi xmlns:a14="http://schemas.microsoft.com/office/drawing/2010/main" val="0"/>
-              </a:ext>
-            </a:extLst>
-          </a:blip>
-          <a:stretch>
-            <a:fillRect/>
-          </a:stretch>
-        </p:blipFill>
-        <p:spPr>
-          <a:xfrm>
-            <a:off x="6037700" y="6364800"/>
-            <a:ext cx="489600" cy="489600"/>
-          </a:xfrm>
-          <a:prstGeom prst="rect">
-            <a:avLst/>
-          </a:prstGeom>
-        </p:spPr>
-      </p:pic>
-      <p:pic>
-        <p:nvPicPr>
-          <p:cNvPr id="113" name="그림 112"/>
-          <p:cNvPicPr>
-            <a:picLocks noChangeAspect="1"/>
-          </p:cNvPicPr>
-          <p:nvPr/>
-        </p:nvPicPr>
-        <p:blipFill>
-          <a:blip r:embed="rId2" cstate="print">
-            <a:extLst>
-              <a:ext uri="{28A0092B-C50C-407E-A947-70E740481C1C}">
-                <a14:useLocalDpi xmlns:a14="http://schemas.microsoft.com/office/drawing/2010/main" val="0"/>
-              </a:ext>
-            </a:extLst>
-          </a:blip>
-          <a:stretch>
-            <a:fillRect/>
-          </a:stretch>
-        </p:blipFill>
-        <p:spPr>
-          <a:xfrm>
-            <a:off x="6527300" y="6364800"/>
-            <a:ext cx="489600" cy="489600"/>
-          </a:xfrm>
-          <a:prstGeom prst="rect">
-            <a:avLst/>
-          </a:prstGeom>
-        </p:spPr>
-      </p:pic>
-      <p:pic>
-        <p:nvPicPr>
-          <p:cNvPr id="114" name="그림 113"/>
-          <p:cNvPicPr>
-            <a:picLocks noChangeAspect="1"/>
-          </p:cNvPicPr>
-          <p:nvPr/>
-        </p:nvPicPr>
-        <p:blipFill>
-          <a:blip r:embed="rId2" cstate="print">
-            <a:extLst>
-              <a:ext uri="{28A0092B-C50C-407E-A947-70E740481C1C}">
-                <a14:useLocalDpi xmlns:a14="http://schemas.microsoft.com/office/drawing/2010/main" val="0"/>
-              </a:ext>
-            </a:extLst>
-          </a:blip>
-          <a:stretch>
-            <a:fillRect/>
-          </a:stretch>
-        </p:blipFill>
-        <p:spPr>
-          <a:xfrm>
-            <a:off x="7016900" y="6364800"/>
-            <a:ext cx="489600" cy="489600"/>
-          </a:xfrm>
-          <a:prstGeom prst="rect">
-            <a:avLst/>
-          </a:prstGeom>
-        </p:spPr>
-      </p:pic>
-      <p:pic>
-        <p:nvPicPr>
-          <p:cNvPr id="115" name="그림 114"/>
-          <p:cNvPicPr>
-            <a:picLocks noChangeAspect="1"/>
-          </p:cNvPicPr>
-          <p:nvPr/>
-        </p:nvPicPr>
-        <p:blipFill>
-          <a:blip r:embed="rId2" cstate="print">
-            <a:extLst>
-              <a:ext uri="{28A0092B-C50C-407E-A947-70E740481C1C}">
-                <a14:useLocalDpi xmlns:a14="http://schemas.microsoft.com/office/drawing/2010/main" val="0"/>
-              </a:ext>
-            </a:extLst>
-          </a:blip>
-          <a:stretch>
-            <a:fillRect/>
-          </a:stretch>
-        </p:blipFill>
-        <p:spPr>
-          <a:xfrm>
-            <a:off x="7506500" y="6364800"/>
-            <a:ext cx="489600" cy="489600"/>
-          </a:xfrm>
-          <a:prstGeom prst="rect">
-            <a:avLst/>
-          </a:prstGeom>
-        </p:spPr>
-      </p:pic>
-      <p:pic>
-        <p:nvPicPr>
-          <p:cNvPr id="116" name="그림 115"/>
-          <p:cNvPicPr>
-            <a:picLocks noChangeAspect="1"/>
-          </p:cNvPicPr>
-          <p:nvPr/>
-        </p:nvPicPr>
-        <p:blipFill>
-          <a:blip r:embed="rId2" cstate="print">
-            <a:extLst>
-              <a:ext uri="{28A0092B-C50C-407E-A947-70E740481C1C}">
-                <a14:useLocalDpi xmlns:a14="http://schemas.microsoft.com/office/drawing/2010/main" val="0"/>
-              </a:ext>
-            </a:extLst>
-          </a:blip>
-          <a:stretch>
-            <a:fillRect/>
-          </a:stretch>
-        </p:blipFill>
-        <p:spPr>
-          <a:xfrm>
-            <a:off x="7996100" y="6364800"/>
-            <a:ext cx="489600" cy="489600"/>
-          </a:xfrm>
-          <a:prstGeom prst="rect">
-            <a:avLst/>
-          </a:prstGeom>
-        </p:spPr>
-      </p:pic>
-      <p:pic>
-        <p:nvPicPr>
-          <p:cNvPr id="118" name="그림 117"/>
-          <p:cNvPicPr>
-            <a:picLocks noChangeAspect="1"/>
-          </p:cNvPicPr>
-          <p:nvPr/>
-        </p:nvPicPr>
-        <p:blipFill>
-          <a:blip r:embed="rId2" cstate="print">
-            <a:extLst>
-              <a:ext uri="{28A0092B-C50C-407E-A947-70E740481C1C}">
-                <a14:useLocalDpi xmlns:a14="http://schemas.microsoft.com/office/drawing/2010/main" val="0"/>
-              </a:ext>
-            </a:extLst>
-          </a:blip>
-          <a:stretch>
-            <a:fillRect/>
-          </a:stretch>
-        </p:blipFill>
-        <p:spPr>
-          <a:xfrm>
-            <a:off x="8485700" y="5875200"/>
-            <a:ext cx="489600" cy="489600"/>
-          </a:xfrm>
-          <a:prstGeom prst="rect">
-            <a:avLst/>
-          </a:prstGeom>
-        </p:spPr>
-      </p:pic>
-      <p:pic>
-        <p:nvPicPr>
-          <p:cNvPr id="119" name="그림 118"/>
-          <p:cNvPicPr>
-            <a:picLocks noChangeAspect="1"/>
-          </p:cNvPicPr>
-          <p:nvPr/>
-        </p:nvPicPr>
-        <p:blipFill>
-          <a:blip r:embed="rId2" cstate="print">
-            <a:extLst>
-              <a:ext uri="{28A0092B-C50C-407E-A947-70E740481C1C}">
-                <a14:useLocalDpi xmlns:a14="http://schemas.microsoft.com/office/drawing/2010/main" val="0"/>
-              </a:ext>
-            </a:extLst>
-          </a:blip>
-          <a:stretch>
-            <a:fillRect/>
-          </a:stretch>
-        </p:blipFill>
-        <p:spPr>
-          <a:xfrm>
-            <a:off x="2120900" y="5875200"/>
-            <a:ext cx="489600" cy="489600"/>
-          </a:xfrm>
-          <a:prstGeom prst="rect">
-            <a:avLst/>
-          </a:prstGeom>
-        </p:spPr>
-      </p:pic>
-      <p:pic>
-        <p:nvPicPr>
-          <p:cNvPr id="121" name="그림 120"/>
-          <p:cNvPicPr>
-            <a:picLocks noChangeAspect="1"/>
-          </p:cNvPicPr>
-          <p:nvPr/>
-        </p:nvPicPr>
-        <p:blipFill>
-          <a:blip r:embed="rId2" cstate="print">
-            <a:extLst>
-              <a:ext uri="{28A0092B-C50C-407E-A947-70E740481C1C}">
-                <a14:useLocalDpi xmlns:a14="http://schemas.microsoft.com/office/drawing/2010/main" val="0"/>
-              </a:ext>
-            </a:extLst>
-          </a:blip>
-          <a:stretch>
-            <a:fillRect/>
-          </a:stretch>
-        </p:blipFill>
-        <p:spPr>
-          <a:xfrm>
-            <a:off x="2120900" y="0"/>
-            <a:ext cx="489600" cy="489600"/>
-          </a:xfrm>
-          <a:prstGeom prst="rect">
-            <a:avLst/>
-          </a:prstGeom>
-        </p:spPr>
-      </p:pic>
-      <p:pic>
-        <p:nvPicPr>
-          <p:cNvPr id="122" name="그림 121"/>
-          <p:cNvPicPr>
-            <a:picLocks noChangeAspect="1"/>
-          </p:cNvPicPr>
-          <p:nvPr/>
-        </p:nvPicPr>
-        <p:blipFill>
-          <a:blip r:embed="rId2" cstate="print">
-            <a:extLst>
-              <a:ext uri="{28A0092B-C50C-407E-A947-70E740481C1C}">
-                <a14:useLocalDpi xmlns:a14="http://schemas.microsoft.com/office/drawing/2010/main" val="0"/>
-              </a:ext>
-            </a:extLst>
-          </a:blip>
-          <a:stretch>
-            <a:fillRect/>
-          </a:stretch>
-        </p:blipFill>
-        <p:spPr>
-          <a:xfrm>
-            <a:off x="8485700" y="0"/>
-            <a:ext cx="489600" cy="489600"/>
-          </a:xfrm>
-          <a:prstGeom prst="rect">
-            <a:avLst/>
-          </a:prstGeom>
-        </p:spPr>
-      </p:pic>
-    </p:spTree>
-    <p:extLst>
-      <p:ext uri="{BB962C8B-B14F-4D97-AF65-F5344CB8AC3E}">
-        <p14:creationId xmlns:p14="http://schemas.microsoft.com/office/powerpoint/2010/main" val="3310017672"/>
-      </p:ext>
-    </p:extLst>
-  </p:cSld>
-  <p:clrMapOvr>
-    <a:masterClrMapping/>
-  </p:clrMapOvr>
-</p:sld>
-</file>
-
 <file path=ppt/theme/theme1.xml><?xml version="1.0" encoding="utf-8"?>
 <a:theme xmlns:a="http://schemas.openxmlformats.org/drawingml/2006/main" name="Office 테마">
   <a:themeElements>

</xml_diff>